<commit_message>
DIAPO profe y borrar imagenes ejercicio
</commit_message>
<xml_diff>
--- a/0_Ramp_Up/documentos/Taller GitHub.pptx
+++ b/0_Ramp_Up/documentos/Taller GitHub.pptx
@@ -6,11 +6,12 @@
   </p:sldMasterIdLst>
   <p:sldIdLst>
     <p:sldId id="256" r:id="rId2"/>
-    <p:sldId id="257" r:id="rId3"/>
-    <p:sldId id="259" r:id="rId4"/>
-    <p:sldId id="258" r:id="rId5"/>
-    <p:sldId id="263" r:id="rId6"/>
-    <p:sldId id="264" r:id="rId7"/>
+    <p:sldId id="265" r:id="rId3"/>
+    <p:sldId id="257" r:id="rId4"/>
+    <p:sldId id="259" r:id="rId5"/>
+    <p:sldId id="258" r:id="rId6"/>
+    <p:sldId id="263" r:id="rId7"/>
+    <p:sldId id="264" r:id="rId8"/>
   </p:sldIdLst>
   <p:sldSz cx="12192000" cy="6858000"/>
   <p:notesSz cx="6858000" cy="9144000"/>
@@ -264,7 +265,7 @@
           <a:p>
             <a:fld id="{243DA1B9-FE7E-4A36-84F8-CF441B40DF45}" type="datetimeFigureOut">
               <a:rPr lang="es-ES" smtClean="0"/>
-              <a:t>21/06/2020</a:t>
+              <a:t>29/06/2020</a:t>
             </a:fld>
             <a:endParaRPr lang="es-ES"/>
           </a:p>
@@ -462,7 +463,7 @@
           <a:p>
             <a:fld id="{243DA1B9-FE7E-4A36-84F8-CF441B40DF45}" type="datetimeFigureOut">
               <a:rPr lang="es-ES" smtClean="0"/>
-              <a:t>21/06/2020</a:t>
+              <a:t>29/06/2020</a:t>
             </a:fld>
             <a:endParaRPr lang="es-ES"/>
           </a:p>
@@ -670,7 +671,7 @@
           <a:p>
             <a:fld id="{243DA1B9-FE7E-4A36-84F8-CF441B40DF45}" type="datetimeFigureOut">
               <a:rPr lang="es-ES" smtClean="0"/>
-              <a:t>21/06/2020</a:t>
+              <a:t>29/06/2020</a:t>
             </a:fld>
             <a:endParaRPr lang="es-ES"/>
           </a:p>
@@ -868,7 +869,7 @@
           <a:p>
             <a:fld id="{243DA1B9-FE7E-4A36-84F8-CF441B40DF45}" type="datetimeFigureOut">
               <a:rPr lang="es-ES" smtClean="0"/>
-              <a:t>21/06/2020</a:t>
+              <a:t>29/06/2020</a:t>
             </a:fld>
             <a:endParaRPr lang="es-ES"/>
           </a:p>
@@ -1143,7 +1144,7 @@
           <a:p>
             <a:fld id="{243DA1B9-FE7E-4A36-84F8-CF441B40DF45}" type="datetimeFigureOut">
               <a:rPr lang="es-ES" smtClean="0"/>
-              <a:t>21/06/2020</a:t>
+              <a:t>29/06/2020</a:t>
             </a:fld>
             <a:endParaRPr lang="es-ES"/>
           </a:p>
@@ -1408,7 +1409,7 @@
           <a:p>
             <a:fld id="{243DA1B9-FE7E-4A36-84F8-CF441B40DF45}" type="datetimeFigureOut">
               <a:rPr lang="es-ES" smtClean="0"/>
-              <a:t>21/06/2020</a:t>
+              <a:t>29/06/2020</a:t>
             </a:fld>
             <a:endParaRPr lang="es-ES"/>
           </a:p>
@@ -1820,7 +1821,7 @@
           <a:p>
             <a:fld id="{243DA1B9-FE7E-4A36-84F8-CF441B40DF45}" type="datetimeFigureOut">
               <a:rPr lang="es-ES" smtClean="0"/>
-              <a:t>21/06/2020</a:t>
+              <a:t>29/06/2020</a:t>
             </a:fld>
             <a:endParaRPr lang="es-ES"/>
           </a:p>
@@ -1961,7 +1962,7 @@
           <a:p>
             <a:fld id="{243DA1B9-FE7E-4A36-84F8-CF441B40DF45}" type="datetimeFigureOut">
               <a:rPr lang="es-ES" smtClean="0"/>
-              <a:t>21/06/2020</a:t>
+              <a:t>29/06/2020</a:t>
             </a:fld>
             <a:endParaRPr lang="es-ES"/>
           </a:p>
@@ -2074,7 +2075,7 @@
           <a:p>
             <a:fld id="{243DA1B9-FE7E-4A36-84F8-CF441B40DF45}" type="datetimeFigureOut">
               <a:rPr lang="es-ES" smtClean="0"/>
-              <a:t>21/06/2020</a:t>
+              <a:t>29/06/2020</a:t>
             </a:fld>
             <a:endParaRPr lang="es-ES"/>
           </a:p>
@@ -2385,7 +2386,7 @@
           <a:p>
             <a:fld id="{243DA1B9-FE7E-4A36-84F8-CF441B40DF45}" type="datetimeFigureOut">
               <a:rPr lang="es-ES" smtClean="0"/>
-              <a:t>21/06/2020</a:t>
+              <a:t>29/06/2020</a:t>
             </a:fld>
             <a:endParaRPr lang="es-ES"/>
           </a:p>
@@ -2673,7 +2674,7 @@
           <a:p>
             <a:fld id="{243DA1B9-FE7E-4A36-84F8-CF441B40DF45}" type="datetimeFigureOut">
               <a:rPr lang="es-ES" smtClean="0"/>
-              <a:t>21/06/2020</a:t>
+              <a:t>29/06/2020</a:t>
             </a:fld>
             <a:endParaRPr lang="es-ES"/>
           </a:p>
@@ -2914,7 +2915,7 @@
           <a:p>
             <a:fld id="{243DA1B9-FE7E-4A36-84F8-CF441B40DF45}" type="datetimeFigureOut">
               <a:rPr lang="es-ES" smtClean="0"/>
-              <a:t>21/06/2020</a:t>
+              <a:t>29/06/2020</a:t>
             </a:fld>
             <a:endParaRPr lang="es-ES"/>
           </a:p>
@@ -3658,6 +3659,89 @@
 <file path=ppt/slides/slide2.xml><?xml version="1.0" encoding="utf-8"?>
 <p:sld xmlns:a="http://schemas.openxmlformats.org/drawingml/2006/main" xmlns:r="http://schemas.openxmlformats.org/officeDocument/2006/relationships" xmlns:p="http://schemas.openxmlformats.org/presentationml/2006/main">
   <p:cSld>
+    <p:spTree>
+      <p:nvGrpSpPr>
+        <p:cNvPr id="1" name=""/>
+        <p:cNvGrpSpPr/>
+        <p:nvPr/>
+      </p:nvGrpSpPr>
+      <p:grpSpPr>
+        <a:xfrm>
+          <a:off x="0" y="0"/>
+          <a:ext cx="0" cy="0"/>
+          <a:chOff x="0" y="0"/>
+          <a:chExt cx="0" cy="0"/>
+        </a:xfrm>
+      </p:grpSpPr>
+      <p:sp>
+        <p:nvSpPr>
+          <p:cNvPr id="2" name="Título 1">
+            <a:extLst>
+              <a:ext uri="{FF2B5EF4-FFF2-40B4-BE49-F238E27FC236}">
+                <a16:creationId xmlns:a16="http://schemas.microsoft.com/office/drawing/2014/main" id="{CBE41FD3-3939-46D9-9960-805C3657FB03}"/>
+              </a:ext>
+            </a:extLst>
+          </p:cNvPr>
+          <p:cNvSpPr>
+            <a:spLocks noGrp="1"/>
+          </p:cNvSpPr>
+          <p:nvPr>
+            <p:ph type="title"/>
+          </p:nvPr>
+        </p:nvSpPr>
+        <p:spPr/>
+        <p:txBody>
+          <a:bodyPr/>
+          <a:lstStyle/>
+          <a:p>
+            <a:r>
+              <a:rPr lang="es-ES"/>
+              <a:t>DIAPO PROFE</a:t>
+            </a:r>
+          </a:p>
+        </p:txBody>
+      </p:sp>
+      <p:sp>
+        <p:nvSpPr>
+          <p:cNvPr id="3" name="Marcador de contenido 2">
+            <a:extLst>
+              <a:ext uri="{FF2B5EF4-FFF2-40B4-BE49-F238E27FC236}">
+                <a16:creationId xmlns:a16="http://schemas.microsoft.com/office/drawing/2014/main" id="{1DFFA733-8668-4110-AED7-1098039BA6FA}"/>
+              </a:ext>
+            </a:extLst>
+          </p:cNvPr>
+          <p:cNvSpPr>
+            <a:spLocks noGrp="1"/>
+          </p:cNvSpPr>
+          <p:nvPr>
+            <p:ph idx="1"/>
+          </p:nvPr>
+        </p:nvSpPr>
+        <p:spPr/>
+        <p:txBody>
+          <a:bodyPr/>
+          <a:lstStyle/>
+          <a:p>
+            <a:endParaRPr lang="es-ES"/>
+          </a:p>
+        </p:txBody>
+      </p:sp>
+    </p:spTree>
+    <p:extLst>
+      <p:ext uri="{BB962C8B-B14F-4D97-AF65-F5344CB8AC3E}">
+        <p14:creationId xmlns:p14="http://schemas.microsoft.com/office/powerpoint/2010/main" val="2047076749"/>
+      </p:ext>
+    </p:extLst>
+  </p:cSld>
+  <p:clrMapOvr>
+    <a:masterClrMapping/>
+  </p:clrMapOvr>
+</p:sld>
+</file>
+
+<file path=ppt/slides/slide3.xml><?xml version="1.0" encoding="utf-8"?>
+<p:sld xmlns:a="http://schemas.openxmlformats.org/drawingml/2006/main" xmlns:r="http://schemas.openxmlformats.org/officeDocument/2006/relationships" xmlns:p="http://schemas.openxmlformats.org/presentationml/2006/main">
+  <p:cSld>
     <p:bg>
       <p:bgPr>
         <a:solidFill>
@@ -3929,7 +4013,7 @@
 </p:sld>
 </file>
 
-<file path=ppt/slides/slide3.xml><?xml version="1.0" encoding="utf-8"?>
+<file path=ppt/slides/slide4.xml><?xml version="1.0" encoding="utf-8"?>
 <p:sld xmlns:a="http://schemas.openxmlformats.org/drawingml/2006/main" xmlns:r="http://schemas.openxmlformats.org/officeDocument/2006/relationships" xmlns:p="http://schemas.openxmlformats.org/presentationml/2006/main">
   <p:cSld>
     <p:spTree>
@@ -4087,7 +4171,7 @@
 </p:sld>
 </file>
 
-<file path=ppt/slides/slide4.xml><?xml version="1.0" encoding="utf-8"?>
+<file path=ppt/slides/slide5.xml><?xml version="1.0" encoding="utf-8"?>
 <p:sld xmlns:a="http://schemas.openxmlformats.org/drawingml/2006/main" xmlns:r="http://schemas.openxmlformats.org/officeDocument/2006/relationships" xmlns:p="http://schemas.openxmlformats.org/presentationml/2006/main">
   <p:cSld>
     <p:spTree>
@@ -4418,7 +4502,7 @@
 </p:sld>
 </file>
 
-<file path=ppt/slides/slide5.xml><?xml version="1.0" encoding="utf-8"?>
+<file path=ppt/slides/slide6.xml><?xml version="1.0" encoding="utf-8"?>
 <p:sld xmlns:a="http://schemas.openxmlformats.org/drawingml/2006/main" xmlns:r="http://schemas.openxmlformats.org/officeDocument/2006/relationships" xmlns:p="http://schemas.openxmlformats.org/presentationml/2006/main">
   <p:cSld>
     <p:spTree>
@@ -4580,7 +4664,7 @@
 </p:sld>
 </file>
 
-<file path=ppt/slides/slide6.xml><?xml version="1.0" encoding="utf-8"?>
+<file path=ppt/slides/slide7.xml><?xml version="1.0" encoding="utf-8"?>
 <p:sld xmlns:a="http://schemas.openxmlformats.org/drawingml/2006/main" xmlns:r="http://schemas.openxmlformats.org/officeDocument/2006/relationships" xmlns:p="http://schemas.openxmlformats.org/presentationml/2006/main">
   <p:cSld>
     <p:spTree>

</xml_diff>

<commit_message>
replico imagen error y segunda diapo para commit
</commit_message>
<xml_diff>
--- a/0_Ramp_Up/documentos/Taller GitHub.pptx
+++ b/0_Ramp_Up/documentos/Taller GitHub.pptx
@@ -7,11 +7,12 @@
   <p:sldIdLst>
     <p:sldId id="256" r:id="rId2"/>
     <p:sldId id="265" r:id="rId3"/>
-    <p:sldId id="257" r:id="rId4"/>
-    <p:sldId id="259" r:id="rId5"/>
-    <p:sldId id="258" r:id="rId6"/>
-    <p:sldId id="263" r:id="rId7"/>
-    <p:sldId id="264" r:id="rId8"/>
+    <p:sldId id="266" r:id="rId4"/>
+    <p:sldId id="257" r:id="rId5"/>
+    <p:sldId id="259" r:id="rId6"/>
+    <p:sldId id="258" r:id="rId7"/>
+    <p:sldId id="263" r:id="rId8"/>
+    <p:sldId id="264" r:id="rId9"/>
   </p:sldIdLst>
   <p:sldSz cx="12192000" cy="6858000"/>
   <p:notesSz cx="6858000" cy="9144000"/>
@@ -3742,6 +3743,93 @@
 <file path=ppt/slides/slide3.xml><?xml version="1.0" encoding="utf-8"?>
 <p:sld xmlns:a="http://schemas.openxmlformats.org/drawingml/2006/main" xmlns:r="http://schemas.openxmlformats.org/officeDocument/2006/relationships" xmlns:p="http://schemas.openxmlformats.org/presentationml/2006/main">
   <p:cSld>
+    <p:spTree>
+      <p:nvGrpSpPr>
+        <p:cNvPr id="1" name=""/>
+        <p:cNvGrpSpPr/>
+        <p:nvPr/>
+      </p:nvGrpSpPr>
+      <p:grpSpPr>
+        <a:xfrm>
+          <a:off x="0" y="0"/>
+          <a:ext cx="0" cy="0"/>
+          <a:chOff x="0" y="0"/>
+          <a:chExt cx="0" cy="0"/>
+        </a:xfrm>
+      </p:grpSpPr>
+      <p:sp>
+        <p:nvSpPr>
+          <p:cNvPr id="2" name="Título 1">
+            <a:extLst>
+              <a:ext uri="{FF2B5EF4-FFF2-40B4-BE49-F238E27FC236}">
+                <a16:creationId xmlns:a16="http://schemas.microsoft.com/office/drawing/2014/main" id="{49B96C95-4CAB-49C6-A081-21C24BA16732}"/>
+              </a:ext>
+            </a:extLst>
+          </p:cNvPr>
+          <p:cNvSpPr>
+            <a:spLocks noGrp="1"/>
+          </p:cNvSpPr>
+          <p:nvPr>
+            <p:ph type="title"/>
+          </p:nvPr>
+        </p:nvSpPr>
+        <p:spPr/>
+        <p:txBody>
+          <a:bodyPr/>
+          <a:lstStyle/>
+          <a:p>
+            <a:r>
+              <a:rPr lang="es-ES" dirty="0"/>
+              <a:t>Diapo de segundo </a:t>
+            </a:r>
+            <a:r>
+              <a:rPr lang="es-ES"/>
+              <a:t>commit</a:t>
+            </a:r>
+          </a:p>
+        </p:txBody>
+      </p:sp>
+      <p:sp>
+        <p:nvSpPr>
+          <p:cNvPr id="3" name="Marcador de contenido 2">
+            <a:extLst>
+              <a:ext uri="{FF2B5EF4-FFF2-40B4-BE49-F238E27FC236}">
+                <a16:creationId xmlns:a16="http://schemas.microsoft.com/office/drawing/2014/main" id="{9F7B3587-2BDA-401F-A3D7-BCD6B61CBF63}"/>
+              </a:ext>
+            </a:extLst>
+          </p:cNvPr>
+          <p:cNvSpPr>
+            <a:spLocks noGrp="1"/>
+          </p:cNvSpPr>
+          <p:nvPr>
+            <p:ph idx="1"/>
+          </p:nvPr>
+        </p:nvSpPr>
+        <p:spPr/>
+        <p:txBody>
+          <a:bodyPr/>
+          <a:lstStyle/>
+          <a:p>
+            <a:endParaRPr lang="es-ES"/>
+          </a:p>
+        </p:txBody>
+      </p:sp>
+    </p:spTree>
+    <p:extLst>
+      <p:ext uri="{BB962C8B-B14F-4D97-AF65-F5344CB8AC3E}">
+        <p14:creationId xmlns:p14="http://schemas.microsoft.com/office/powerpoint/2010/main" val="2245273752"/>
+      </p:ext>
+    </p:extLst>
+  </p:cSld>
+  <p:clrMapOvr>
+    <a:masterClrMapping/>
+  </p:clrMapOvr>
+</p:sld>
+</file>
+
+<file path=ppt/slides/slide4.xml><?xml version="1.0" encoding="utf-8"?>
+<p:sld xmlns:a="http://schemas.openxmlformats.org/drawingml/2006/main" xmlns:r="http://schemas.openxmlformats.org/officeDocument/2006/relationships" xmlns:p="http://schemas.openxmlformats.org/presentationml/2006/main">
+  <p:cSld>
     <p:bg>
       <p:bgPr>
         <a:solidFill>
@@ -4013,7 +4101,7 @@
 </p:sld>
 </file>
 
-<file path=ppt/slides/slide4.xml><?xml version="1.0" encoding="utf-8"?>
+<file path=ppt/slides/slide5.xml><?xml version="1.0" encoding="utf-8"?>
 <p:sld xmlns:a="http://schemas.openxmlformats.org/drawingml/2006/main" xmlns:r="http://schemas.openxmlformats.org/officeDocument/2006/relationships" xmlns:p="http://schemas.openxmlformats.org/presentationml/2006/main">
   <p:cSld>
     <p:spTree>
@@ -4171,7 +4259,7 @@
 </p:sld>
 </file>
 
-<file path=ppt/slides/slide5.xml><?xml version="1.0" encoding="utf-8"?>
+<file path=ppt/slides/slide6.xml><?xml version="1.0" encoding="utf-8"?>
 <p:sld xmlns:a="http://schemas.openxmlformats.org/drawingml/2006/main" xmlns:r="http://schemas.openxmlformats.org/officeDocument/2006/relationships" xmlns:p="http://schemas.openxmlformats.org/presentationml/2006/main">
   <p:cSld>
     <p:spTree>
@@ -4502,7 +4590,7 @@
 </p:sld>
 </file>
 
-<file path=ppt/slides/slide6.xml><?xml version="1.0" encoding="utf-8"?>
+<file path=ppt/slides/slide7.xml><?xml version="1.0" encoding="utf-8"?>
 <p:sld xmlns:a="http://schemas.openxmlformats.org/drawingml/2006/main" xmlns:r="http://schemas.openxmlformats.org/officeDocument/2006/relationships" xmlns:p="http://schemas.openxmlformats.org/presentationml/2006/main">
   <p:cSld>
     <p:spTree>
@@ -4664,7 +4752,7 @@
 </p:sld>
 </file>
 
-<file path=ppt/slides/slide7.xml><?xml version="1.0" encoding="utf-8"?>
+<file path=ppt/slides/slide8.xml><?xml version="1.0" encoding="utf-8"?>
 <p:sld xmlns:a="http://schemas.openxmlformats.org/drawingml/2006/main" xmlns:r="http://schemas.openxmlformats.org/officeDocument/2006/relationships" xmlns:p="http://schemas.openxmlformats.org/presentationml/2006/main">
   <p:cSld>
     <p:spTree>

</xml_diff>

<commit_message>
añado imagen funciones y diapo en taller de github
</commit_message>
<xml_diff>
--- a/0_Ramp_Up/documentos/Taller GitHub.pptx
+++ b/0_Ramp_Up/documentos/Taller GitHub.pptx
@@ -11,6 +11,7 @@
     <p:sldId id="258" r:id="rId5"/>
     <p:sldId id="263" r:id="rId6"/>
     <p:sldId id="264" r:id="rId7"/>
+    <p:sldId id="265" r:id="rId8"/>
   </p:sldIdLst>
   <p:sldSz cx="12192000" cy="6858000"/>
   <p:notesSz cx="6858000" cy="9144000"/>
@@ -4657,6 +4658,89 @@
 </p:sld>
 </file>
 
+<file path=ppt/slides/slide7.xml><?xml version="1.0" encoding="utf-8"?>
+<p:sld xmlns:a="http://schemas.openxmlformats.org/drawingml/2006/main" xmlns:r="http://schemas.openxmlformats.org/officeDocument/2006/relationships" xmlns:p="http://schemas.openxmlformats.org/presentationml/2006/main">
+  <p:cSld>
+    <p:spTree>
+      <p:nvGrpSpPr>
+        <p:cNvPr id="1" name=""/>
+        <p:cNvGrpSpPr/>
+        <p:nvPr/>
+      </p:nvGrpSpPr>
+      <p:grpSpPr>
+        <a:xfrm>
+          <a:off x="0" y="0"/>
+          <a:ext cx="0" cy="0"/>
+          <a:chOff x="0" y="0"/>
+          <a:chExt cx="0" cy="0"/>
+        </a:xfrm>
+      </p:grpSpPr>
+      <p:sp>
+        <p:nvSpPr>
+          <p:cNvPr id="2" name="Título 1">
+            <a:extLst>
+              <a:ext uri="{FF2B5EF4-FFF2-40B4-BE49-F238E27FC236}">
+                <a16:creationId xmlns:a16="http://schemas.microsoft.com/office/drawing/2014/main" id="{DAB696A7-44D7-4FF7-8116-FA15AA0E3357}"/>
+              </a:ext>
+            </a:extLst>
+          </p:cNvPr>
+          <p:cNvSpPr>
+            <a:spLocks noGrp="1"/>
+          </p:cNvSpPr>
+          <p:nvPr>
+            <p:ph type="title"/>
+          </p:nvPr>
+        </p:nvSpPr>
+        <p:spPr/>
+        <p:txBody>
+          <a:bodyPr/>
+          <a:lstStyle/>
+          <a:p>
+            <a:r>
+              <a:rPr lang="es-ES"/>
+              <a:t>Diapo del profe</a:t>
+            </a:r>
+          </a:p>
+        </p:txBody>
+      </p:sp>
+      <p:sp>
+        <p:nvSpPr>
+          <p:cNvPr id="3" name="Marcador de contenido 2">
+            <a:extLst>
+              <a:ext uri="{FF2B5EF4-FFF2-40B4-BE49-F238E27FC236}">
+                <a16:creationId xmlns:a16="http://schemas.microsoft.com/office/drawing/2014/main" id="{457260A6-38F5-4675-BF9B-1A4B3FDC976A}"/>
+              </a:ext>
+            </a:extLst>
+          </p:cNvPr>
+          <p:cNvSpPr>
+            <a:spLocks noGrp="1"/>
+          </p:cNvSpPr>
+          <p:nvPr>
+            <p:ph idx="1"/>
+          </p:nvPr>
+        </p:nvSpPr>
+        <p:spPr/>
+        <p:txBody>
+          <a:bodyPr/>
+          <a:lstStyle/>
+          <a:p>
+            <a:endParaRPr lang="es-ES"/>
+          </a:p>
+        </p:txBody>
+      </p:sp>
+    </p:spTree>
+    <p:extLst>
+      <p:ext uri="{BB962C8B-B14F-4D97-AF65-F5344CB8AC3E}">
+        <p14:creationId xmlns:p14="http://schemas.microsoft.com/office/powerpoint/2010/main" val="2597954801"/>
+      </p:ext>
+    </p:extLst>
+  </p:cSld>
+  <p:clrMapOvr>
+    <a:masterClrMapping/>
+  </p:clrMapOvr>
+</p:sld>
+</file>
+
 <file path=ppt/theme/theme1.xml><?xml version="1.0" encoding="utf-8"?>
 <a:theme xmlns:a="http://schemas.openxmlformats.org/drawingml/2006/main" name="Tema de Office">
   <a:themeElements>

</xml_diff>